<commit_message>
Talk: updating numbers, showcase websites, DotNest mention
</commit_message>
<xml_diff>
--- a/IntroductoryTalkTemplate/Orchard Core CMS introductory talk.pptx
+++ b/IntroductoryTalkTemplate/Orchard Core CMS introductory talk.pptx
@@ -262,7 +262,7 @@
           <a:p>
             <a:fld id="{E4359F16-E075-46EA-9430-278A6D2F0D2B}" type="datetimeFigureOut">
               <a:rPr lang="en-US" smtClean="0"/>
-              <a:t>3/12/2021</a:t>
+              <a:t>11/19/2021</a:t>
             </a:fld>
             <a:endParaRPr lang="en-US"/>
           </a:p>
@@ -1835,7 +1835,7 @@
           <a:p>
             <a:fld id="{20A66C5D-9C61-42DD-99EE-FB9C623F065C}" type="datetimeFigureOut">
               <a:rPr lang="en-US" smtClean="0"/>
-              <a:t>3/12/2021</a:t>
+              <a:t>11/19/2021</a:t>
             </a:fld>
             <a:endParaRPr lang="en-US"/>
           </a:p>
@@ -2033,7 +2033,7 @@
           <a:p>
             <a:fld id="{20A66C5D-9C61-42DD-99EE-FB9C623F065C}" type="datetimeFigureOut">
               <a:rPr lang="en-US" smtClean="0"/>
-              <a:t>3/12/2021</a:t>
+              <a:t>11/19/2021</a:t>
             </a:fld>
             <a:endParaRPr lang="en-US"/>
           </a:p>
@@ -2241,7 +2241,7 @@
           <a:p>
             <a:fld id="{20A66C5D-9C61-42DD-99EE-FB9C623F065C}" type="datetimeFigureOut">
               <a:rPr lang="en-US" smtClean="0"/>
-              <a:t>3/12/2021</a:t>
+              <a:t>11/19/2021</a:t>
             </a:fld>
             <a:endParaRPr lang="en-US"/>
           </a:p>
@@ -2439,7 +2439,7 @@
           <a:p>
             <a:fld id="{20A66C5D-9C61-42DD-99EE-FB9C623F065C}" type="datetimeFigureOut">
               <a:rPr lang="en-US" smtClean="0"/>
-              <a:t>3/12/2021</a:t>
+              <a:t>11/19/2021</a:t>
             </a:fld>
             <a:endParaRPr lang="en-US"/>
           </a:p>
@@ -2714,7 +2714,7 @@
           <a:p>
             <a:fld id="{20A66C5D-9C61-42DD-99EE-FB9C623F065C}" type="datetimeFigureOut">
               <a:rPr lang="en-US" smtClean="0"/>
-              <a:t>3/12/2021</a:t>
+              <a:t>11/19/2021</a:t>
             </a:fld>
             <a:endParaRPr lang="en-US"/>
           </a:p>
@@ -2979,7 +2979,7 @@
           <a:p>
             <a:fld id="{20A66C5D-9C61-42DD-99EE-FB9C623F065C}" type="datetimeFigureOut">
               <a:rPr lang="en-US" smtClean="0"/>
-              <a:t>3/12/2021</a:t>
+              <a:t>11/19/2021</a:t>
             </a:fld>
             <a:endParaRPr lang="en-US"/>
           </a:p>
@@ -3391,7 +3391,7 @@
           <a:p>
             <a:fld id="{20A66C5D-9C61-42DD-99EE-FB9C623F065C}" type="datetimeFigureOut">
               <a:rPr lang="en-US" smtClean="0"/>
-              <a:t>3/12/2021</a:t>
+              <a:t>11/19/2021</a:t>
             </a:fld>
             <a:endParaRPr lang="en-US"/>
           </a:p>
@@ -3532,7 +3532,7 @@
           <a:p>
             <a:fld id="{20A66C5D-9C61-42DD-99EE-FB9C623F065C}" type="datetimeFigureOut">
               <a:rPr lang="en-US" smtClean="0"/>
-              <a:t>3/12/2021</a:t>
+              <a:t>11/19/2021</a:t>
             </a:fld>
             <a:endParaRPr lang="en-US"/>
           </a:p>
@@ -3645,7 +3645,7 @@
           <a:p>
             <a:fld id="{20A66C5D-9C61-42DD-99EE-FB9C623F065C}" type="datetimeFigureOut">
               <a:rPr lang="en-US" smtClean="0"/>
-              <a:t>3/12/2021</a:t>
+              <a:t>11/19/2021</a:t>
             </a:fld>
             <a:endParaRPr lang="en-US"/>
           </a:p>
@@ -3956,7 +3956,7 @@
           <a:p>
             <a:fld id="{20A66C5D-9C61-42DD-99EE-FB9C623F065C}" type="datetimeFigureOut">
               <a:rPr lang="en-US" smtClean="0"/>
-              <a:t>3/12/2021</a:t>
+              <a:t>11/19/2021</a:t>
             </a:fld>
             <a:endParaRPr lang="en-US"/>
           </a:p>
@@ -4244,7 +4244,7 @@
           <a:p>
             <a:fld id="{20A66C5D-9C61-42DD-99EE-FB9C623F065C}" type="datetimeFigureOut">
               <a:rPr lang="en-US" smtClean="0"/>
-              <a:t>3/12/2021</a:t>
+              <a:t>11/19/2021</a:t>
             </a:fld>
             <a:endParaRPr lang="en-US"/>
           </a:p>
@@ -4485,7 +4485,7 @@
           <a:p>
             <a:fld id="{20A66C5D-9C61-42DD-99EE-FB9C623F065C}" type="datetimeFigureOut">
               <a:rPr lang="en-US" smtClean="0"/>
-              <a:t>3/12/2021</a:t>
+              <a:t>11/19/2021</a:t>
             </a:fld>
             <a:endParaRPr lang="en-US"/>
           </a:p>
@@ -5048,7 +5048,7 @@
         <p:spPr/>
         <p:txBody>
           <a:bodyPr>
-            <a:normAutofit fontScale="92500" lnSpcReduction="20000"/>
+            <a:normAutofit lnSpcReduction="10000"/>
           </a:bodyPr>
           <a:lstStyle/>
           <a:p>
@@ -5074,7 +5074,7 @@
           <a:p>
             <a:r>
               <a:rPr lang="en-US" dirty="0"/>
-              <a:t>www.patientaccess.com</a:t>
+              <a:t>aerospacecornwall.co.uk</a:t>
             </a:r>
           </a:p>
           <a:p>
@@ -5086,13 +5086,7 @@
           <a:p>
             <a:r>
               <a:rPr lang="en-US" dirty="0"/>
-              <a:t>www.lexus.co.za</a:t>
-            </a:r>
-          </a:p>
-          <a:p>
-            <a:r>
-              <a:rPr lang="en-US" dirty="0"/>
-              <a:t>bethany.org</a:t>
+              <a:t>santamonica.gov</a:t>
             </a:r>
           </a:p>
           <a:p>
@@ -5283,7 +5277,7 @@
           <a:p>
             <a:r>
               <a:rPr lang="en-US" dirty="0"/>
-              <a:t>Eventually DotNest SaaS</a:t>
+              <a:t>DotNest SaaS</a:t>
             </a:r>
           </a:p>
         </p:txBody>
@@ -5773,7 +5767,15 @@
             </a:r>
             <a:r>
               <a:rPr lang="hu-HU" dirty="0"/>
-              <a:t> 3+, ASP.NET </a:t>
+              <a:t> 3</a:t>
+            </a:r>
+            <a:r>
+              <a:rPr lang="en-US" dirty="0"/>
+              <a:t>/.NET 5/.NET 6</a:t>
+            </a:r>
+            <a:r>
+              <a:rPr lang="hu-HU" dirty="0"/>
+              <a:t>, ASP.NET </a:t>
             </a:r>
             <a:r>
               <a:rPr lang="hu-HU" dirty="0" err="1"/>
@@ -5812,7 +5814,7 @@
               <a:rPr lang="en-US" dirty="0">
                 <a:cs typeface="Calibri"/>
               </a:rPr>
-              <a:t>50</a:t>
+              <a:t>55</a:t>
             </a:r>
             <a:r>
               <a:rPr lang="hu-HU" dirty="0">
@@ -5830,13 +5832,13 @@
               <a:rPr lang="hu-HU" dirty="0">
                 <a:cs typeface="Calibri"/>
               </a:rPr>
-              <a:t>, 1</a:t>
+              <a:t>, </a:t>
             </a:r>
             <a:r>
               <a:rPr lang="en-US" dirty="0">
                 <a:cs typeface="Calibri"/>
               </a:rPr>
-              <a:t>90</a:t>
+              <a:t>200</a:t>
             </a:r>
             <a:r>
               <a:rPr lang="hu-HU" dirty="0">
@@ -5854,13 +5856,13 @@
               <a:rPr lang="hu-HU" dirty="0">
                 <a:cs typeface="Calibri"/>
               </a:rPr>
-              <a:t>, 4</a:t>
+              <a:t>, </a:t>
             </a:r>
             <a:r>
               <a:rPr lang="en-US" dirty="0">
                 <a:cs typeface="Calibri"/>
               </a:rPr>
-              <a:t>7</a:t>
+              <a:t>52</a:t>
             </a:r>
             <a:r>
               <a:rPr lang="hu-HU" dirty="0">
@@ -5878,13 +5880,13 @@
               <a:rPr lang="hu-HU" dirty="0">
                 <a:cs typeface="Calibri"/>
               </a:rPr>
-              <a:t> (3</a:t>
+              <a:t> (</a:t>
             </a:r>
             <a:r>
               <a:rPr lang="en-US" dirty="0">
                 <a:cs typeface="Calibri"/>
               </a:rPr>
-              <a:t>8</a:t>
+              <a:t>42</a:t>
             </a:r>
             <a:r>
               <a:rPr lang="hu-HU" dirty="0">

</xml_diff>

<commit_message>
Updating example sites, .NET wording
</commit_message>
<xml_diff>
--- a/IntroductoryTalkTemplate/Orchard Core CMS introductory talk.pptx
+++ b/IntroductoryTalkTemplate/Orchard Core CMS introductory talk.pptx
@@ -262,7 +262,7 @@
           <a:p>
             <a:fld id="{E4359F16-E075-46EA-9430-278A6D2F0D2B}" type="datetimeFigureOut">
               <a:rPr lang="en-US" smtClean="0"/>
-              <a:t>11/2/2022</a:t>
+              <a:t>11/3/2022</a:t>
             </a:fld>
             <a:endParaRPr lang="en-US"/>
           </a:p>
@@ -1835,7 +1835,7 @@
           <a:p>
             <a:fld id="{20A66C5D-9C61-42DD-99EE-FB9C623F065C}" type="datetimeFigureOut">
               <a:rPr lang="en-US" smtClean="0"/>
-              <a:t>11/2/2022</a:t>
+              <a:t>11/3/2022</a:t>
             </a:fld>
             <a:endParaRPr lang="en-US"/>
           </a:p>
@@ -2033,7 +2033,7 @@
           <a:p>
             <a:fld id="{20A66C5D-9C61-42DD-99EE-FB9C623F065C}" type="datetimeFigureOut">
               <a:rPr lang="en-US" smtClean="0"/>
-              <a:t>11/2/2022</a:t>
+              <a:t>11/3/2022</a:t>
             </a:fld>
             <a:endParaRPr lang="en-US"/>
           </a:p>
@@ -2241,7 +2241,7 @@
           <a:p>
             <a:fld id="{20A66C5D-9C61-42DD-99EE-FB9C623F065C}" type="datetimeFigureOut">
               <a:rPr lang="en-US" smtClean="0"/>
-              <a:t>11/2/2022</a:t>
+              <a:t>11/3/2022</a:t>
             </a:fld>
             <a:endParaRPr lang="en-US"/>
           </a:p>
@@ -2439,7 +2439,7 @@
           <a:p>
             <a:fld id="{20A66C5D-9C61-42DD-99EE-FB9C623F065C}" type="datetimeFigureOut">
               <a:rPr lang="en-US" smtClean="0"/>
-              <a:t>11/2/2022</a:t>
+              <a:t>11/3/2022</a:t>
             </a:fld>
             <a:endParaRPr lang="en-US"/>
           </a:p>
@@ -2714,7 +2714,7 @@
           <a:p>
             <a:fld id="{20A66C5D-9C61-42DD-99EE-FB9C623F065C}" type="datetimeFigureOut">
               <a:rPr lang="en-US" smtClean="0"/>
-              <a:t>11/2/2022</a:t>
+              <a:t>11/3/2022</a:t>
             </a:fld>
             <a:endParaRPr lang="en-US"/>
           </a:p>
@@ -2979,7 +2979,7 @@
           <a:p>
             <a:fld id="{20A66C5D-9C61-42DD-99EE-FB9C623F065C}" type="datetimeFigureOut">
               <a:rPr lang="en-US" smtClean="0"/>
-              <a:t>11/2/2022</a:t>
+              <a:t>11/3/2022</a:t>
             </a:fld>
             <a:endParaRPr lang="en-US"/>
           </a:p>
@@ -3391,7 +3391,7 @@
           <a:p>
             <a:fld id="{20A66C5D-9C61-42DD-99EE-FB9C623F065C}" type="datetimeFigureOut">
               <a:rPr lang="en-US" smtClean="0"/>
-              <a:t>11/2/2022</a:t>
+              <a:t>11/3/2022</a:t>
             </a:fld>
             <a:endParaRPr lang="en-US"/>
           </a:p>
@@ -3532,7 +3532,7 @@
           <a:p>
             <a:fld id="{20A66C5D-9C61-42DD-99EE-FB9C623F065C}" type="datetimeFigureOut">
               <a:rPr lang="en-US" smtClean="0"/>
-              <a:t>11/2/2022</a:t>
+              <a:t>11/3/2022</a:t>
             </a:fld>
             <a:endParaRPr lang="en-US"/>
           </a:p>
@@ -3645,7 +3645,7 @@
           <a:p>
             <a:fld id="{20A66C5D-9C61-42DD-99EE-FB9C623F065C}" type="datetimeFigureOut">
               <a:rPr lang="en-US" smtClean="0"/>
-              <a:t>11/2/2022</a:t>
+              <a:t>11/3/2022</a:t>
             </a:fld>
             <a:endParaRPr lang="en-US"/>
           </a:p>
@@ -3956,7 +3956,7 @@
           <a:p>
             <a:fld id="{20A66C5D-9C61-42DD-99EE-FB9C623F065C}" type="datetimeFigureOut">
               <a:rPr lang="en-US" smtClean="0"/>
-              <a:t>11/2/2022</a:t>
+              <a:t>11/3/2022</a:t>
             </a:fld>
             <a:endParaRPr lang="en-US"/>
           </a:p>
@@ -4244,7 +4244,7 @@
           <a:p>
             <a:fld id="{20A66C5D-9C61-42DD-99EE-FB9C623F065C}" type="datetimeFigureOut">
               <a:rPr lang="en-US" smtClean="0"/>
-              <a:t>11/2/2022</a:t>
+              <a:t>11/3/2022</a:t>
             </a:fld>
             <a:endParaRPr lang="en-US"/>
           </a:p>
@@ -4485,7 +4485,7 @@
           <a:p>
             <a:fld id="{20A66C5D-9C61-42DD-99EE-FB9C623F065C}" type="datetimeFigureOut">
               <a:rPr lang="en-US" smtClean="0"/>
-              <a:t>11/2/2022</a:t>
+              <a:t>11/3/2022</a:t>
             </a:fld>
             <a:endParaRPr lang="en-US"/>
           </a:p>
@@ -5048,20 +5048,13 @@
         <p:spPr/>
         <p:txBody>
           <a:bodyPr>
-            <a:normAutofit lnSpcReduction="10000"/>
+            <a:normAutofit/>
           </a:bodyPr>
           <a:lstStyle/>
           <a:p>
             <a:r>
               <a:rPr lang="en-US" dirty="0"/>
               <a:t>www.starbucks.com.sg</a:t>
-            </a:r>
-            <a:endParaRPr lang="hu-HU" dirty="0"/>
-          </a:p>
-          <a:p>
-            <a:r>
-              <a:rPr lang="en-US" dirty="0"/>
-              <a:t>www.finitive.com</a:t>
             </a:r>
             <a:endParaRPr lang="hu-HU" dirty="0"/>
           </a:p>
@@ -5259,7 +5252,15 @@
           <a:p>
             <a:r>
               <a:rPr lang="en-US" dirty="0"/>
-              <a:t>Anywhere where .NET Core runs (Kestrel)</a:t>
+              <a:t>Anywhere where .</a:t>
+            </a:r>
+            <a:r>
+              <a:rPr lang="en-US"/>
+              <a:t>NET runs </a:t>
+            </a:r>
+            <a:r>
+              <a:rPr lang="en-US" dirty="0"/>
+              <a:t>(Kestrel)</a:t>
             </a:r>
           </a:p>
           <a:p>

</xml_diff>

<commit_message>
Updating PPT numbers, sites
</commit_message>
<xml_diff>
--- a/IntroductoryTalkTemplate/Orchard Core CMS introductory talk.pptx
+++ b/IntroductoryTalkTemplate/Orchard Core CMS introductory talk.pptx
@@ -262,7 +262,7 @@
           <a:p>
             <a:fld id="{E4359F16-E075-46EA-9430-278A6D2F0D2B}" type="datetimeFigureOut">
               <a:rPr lang="en-US" smtClean="0"/>
-              <a:t>11/3/2022</a:t>
+              <a:t>5/9/2023</a:t>
             </a:fld>
             <a:endParaRPr lang="en-US"/>
           </a:p>
@@ -1835,7 +1835,7 @@
           <a:p>
             <a:fld id="{20A66C5D-9C61-42DD-99EE-FB9C623F065C}" type="datetimeFigureOut">
               <a:rPr lang="en-US" smtClean="0"/>
-              <a:t>11/3/2022</a:t>
+              <a:t>5/9/2023</a:t>
             </a:fld>
             <a:endParaRPr lang="en-US"/>
           </a:p>
@@ -2033,7 +2033,7 @@
           <a:p>
             <a:fld id="{20A66C5D-9C61-42DD-99EE-FB9C623F065C}" type="datetimeFigureOut">
               <a:rPr lang="en-US" smtClean="0"/>
-              <a:t>11/3/2022</a:t>
+              <a:t>5/9/2023</a:t>
             </a:fld>
             <a:endParaRPr lang="en-US"/>
           </a:p>
@@ -2241,7 +2241,7 @@
           <a:p>
             <a:fld id="{20A66C5D-9C61-42DD-99EE-FB9C623F065C}" type="datetimeFigureOut">
               <a:rPr lang="en-US" smtClean="0"/>
-              <a:t>11/3/2022</a:t>
+              <a:t>5/9/2023</a:t>
             </a:fld>
             <a:endParaRPr lang="en-US"/>
           </a:p>
@@ -2439,7 +2439,7 @@
           <a:p>
             <a:fld id="{20A66C5D-9C61-42DD-99EE-FB9C623F065C}" type="datetimeFigureOut">
               <a:rPr lang="en-US" smtClean="0"/>
-              <a:t>11/3/2022</a:t>
+              <a:t>5/9/2023</a:t>
             </a:fld>
             <a:endParaRPr lang="en-US"/>
           </a:p>
@@ -2714,7 +2714,7 @@
           <a:p>
             <a:fld id="{20A66C5D-9C61-42DD-99EE-FB9C623F065C}" type="datetimeFigureOut">
               <a:rPr lang="en-US" smtClean="0"/>
-              <a:t>11/3/2022</a:t>
+              <a:t>5/9/2023</a:t>
             </a:fld>
             <a:endParaRPr lang="en-US"/>
           </a:p>
@@ -2979,7 +2979,7 @@
           <a:p>
             <a:fld id="{20A66C5D-9C61-42DD-99EE-FB9C623F065C}" type="datetimeFigureOut">
               <a:rPr lang="en-US" smtClean="0"/>
-              <a:t>11/3/2022</a:t>
+              <a:t>5/9/2023</a:t>
             </a:fld>
             <a:endParaRPr lang="en-US"/>
           </a:p>
@@ -3391,7 +3391,7 @@
           <a:p>
             <a:fld id="{20A66C5D-9C61-42DD-99EE-FB9C623F065C}" type="datetimeFigureOut">
               <a:rPr lang="en-US" smtClean="0"/>
-              <a:t>11/3/2022</a:t>
+              <a:t>5/9/2023</a:t>
             </a:fld>
             <a:endParaRPr lang="en-US"/>
           </a:p>
@@ -3532,7 +3532,7 @@
           <a:p>
             <a:fld id="{20A66C5D-9C61-42DD-99EE-FB9C623F065C}" type="datetimeFigureOut">
               <a:rPr lang="en-US" smtClean="0"/>
-              <a:t>11/3/2022</a:t>
+              <a:t>5/9/2023</a:t>
             </a:fld>
             <a:endParaRPr lang="en-US"/>
           </a:p>
@@ -3645,7 +3645,7 @@
           <a:p>
             <a:fld id="{20A66C5D-9C61-42DD-99EE-FB9C623F065C}" type="datetimeFigureOut">
               <a:rPr lang="en-US" smtClean="0"/>
-              <a:t>11/3/2022</a:t>
+              <a:t>5/9/2023</a:t>
             </a:fld>
             <a:endParaRPr lang="en-US"/>
           </a:p>
@@ -3956,7 +3956,7 @@
           <a:p>
             <a:fld id="{20A66C5D-9C61-42DD-99EE-FB9C623F065C}" type="datetimeFigureOut">
               <a:rPr lang="en-US" smtClean="0"/>
-              <a:t>11/3/2022</a:t>
+              <a:t>5/9/2023</a:t>
             </a:fld>
             <a:endParaRPr lang="en-US"/>
           </a:p>
@@ -4244,7 +4244,7 @@
           <a:p>
             <a:fld id="{20A66C5D-9C61-42DD-99EE-FB9C623F065C}" type="datetimeFigureOut">
               <a:rPr lang="en-US" smtClean="0"/>
-              <a:t>11/3/2022</a:t>
+              <a:t>5/9/2023</a:t>
             </a:fld>
             <a:endParaRPr lang="en-US"/>
           </a:p>
@@ -4485,7 +4485,7 @@
           <a:p>
             <a:fld id="{20A66C5D-9C61-42DD-99EE-FB9C623F065C}" type="datetimeFigureOut">
               <a:rPr lang="en-US" smtClean="0"/>
-              <a:t>11/3/2022</a:t>
+              <a:t>5/9/2023</a:t>
             </a:fld>
             <a:endParaRPr lang="en-US"/>
           </a:p>
@@ -4920,19 +4920,14 @@
         </p:nvSpPr>
         <p:spPr/>
         <p:txBody>
-          <a:bodyPr/>
+          <a:bodyPr>
+            <a:normAutofit fontScale="90000"/>
+          </a:bodyPr>
           <a:lstStyle/>
           <a:p>
             <a:r>
               <a:rPr lang="en-US" dirty="0"/>
-              <a:t>A walk in the park</a:t>
-            </a:r>
-            <a:br>
-              <a:rPr lang="en-US" dirty="0"/>
-            </a:br>
-            <a:r>
-              <a:rPr lang="en-US" dirty="0"/>
-              <a:t>Orchard Core CMS</a:t>
+              <a:t>Modern .NET web development with batteries included Showcasing Orchard Core CMS</a:t>
             </a:r>
           </a:p>
         </p:txBody>
@@ -5054,9 +5049,8 @@
           <a:p>
             <a:r>
               <a:rPr lang="en-US" dirty="0"/>
-              <a:t>www.starbucks.com.sg</a:t>
-            </a:r>
-            <a:endParaRPr lang="hu-HU" dirty="0"/>
+              <a:t>www.playtfr.com</a:t>
+            </a:r>
           </a:p>
           <a:p>
             <a:r>
@@ -5067,7 +5061,7 @@
           <a:p>
             <a:r>
               <a:rPr lang="en-US" dirty="0"/>
-              <a:t>aerospacecornwall.co.uk</a:t>
+              <a:t>fly.eg</a:t>
             </a:r>
           </a:p>
           <a:p>
@@ -5252,7 +5246,7 @@
           <a:p>
             <a:r>
               <a:rPr lang="en-US" dirty="0"/>
-              <a:t>Anywhere where .NET runs (Kestrel)</a:t>
+              <a:t>Anywhere where .NET runs</a:t>
             </a:r>
           </a:p>
           <a:p>
@@ -5269,10 +5263,9 @@
           </a:p>
           <a:p>
             <a:r>
-              <a:rPr lang="en-US"/>
+              <a:rPr lang="en-US" dirty="0"/>
               <a:t>DotNest SaaS (dotnest.com)</a:t>
             </a:r>
-            <a:endParaRPr lang="en-US" dirty="0"/>
           </a:p>
         </p:txBody>
       </p:sp>
@@ -5753,7 +5746,7 @@
           <a:p>
             <a:r>
               <a:rPr lang="en-US" dirty="0"/>
-              <a:t>.NET 6</a:t>
+              <a:t>.NET 6/7</a:t>
             </a:r>
             <a:r>
               <a:rPr lang="hu-HU" dirty="0"/>
@@ -5796,7 +5789,7 @@
               <a:rPr lang="en-US" dirty="0">
                 <a:cs typeface="Calibri"/>
               </a:rPr>
-              <a:t>63</a:t>
+              <a:t>67</a:t>
             </a:r>
             <a:r>
               <a:rPr lang="hu-HU" dirty="0">
@@ -5820,7 +5813,7 @@
               <a:rPr lang="en-US" dirty="0">
                 <a:cs typeface="Calibri"/>
               </a:rPr>
-              <a:t>230</a:t>
+              <a:t>240</a:t>
             </a:r>
             <a:r>
               <a:rPr lang="hu-HU" dirty="0">
@@ -5844,7 +5837,7 @@
               <a:rPr lang="en-US" dirty="0">
                 <a:cs typeface="Calibri"/>
               </a:rPr>
-              <a:t>57</a:t>
+              <a:t>60</a:t>
             </a:r>
             <a:r>
               <a:rPr lang="hu-HU" dirty="0">
@@ -5868,7 +5861,7 @@
               <a:rPr lang="en-US" dirty="0">
                 <a:cs typeface="Calibri"/>
               </a:rPr>
-              <a:t>46</a:t>
+              <a:t>48</a:t>
             </a:r>
             <a:r>
               <a:rPr lang="hu-HU" dirty="0">

</xml_diff>